<commit_message>
complete the lambda code
</commit_message>
<xml_diff>
--- a/k8x.pptx
+++ b/k8x.pptx
@@ -9,6 +9,7 @@
     <p:sldId id="257" r:id="rId3"/>
     <p:sldId id="258" r:id="rId4"/>
     <p:sldId id="259" r:id="rId5"/>
+    <p:sldId id="260" r:id="rId6"/>
   </p:sldIdLst>
   <p:sldSz cx="12192000" cy="6858000"/>
   <p:notesSz cx="6858000" cy="9144000"/>
@@ -264,7 +265,7 @@
           <a:p>
             <a:fld id="{967748FD-B821-446F-8B81-6507FBF70AB5}" type="datetimeFigureOut">
               <a:rPr lang="en-GB" smtClean="0"/>
-              <a:t>15/11/2023</a:t>
+              <a:t>16/11/2023</a:t>
             </a:fld>
             <a:endParaRPr lang="en-GB"/>
           </a:p>
@@ -464,7 +465,7 @@
           <a:p>
             <a:fld id="{967748FD-B821-446F-8B81-6507FBF70AB5}" type="datetimeFigureOut">
               <a:rPr lang="en-GB" smtClean="0"/>
-              <a:t>15/11/2023</a:t>
+              <a:t>16/11/2023</a:t>
             </a:fld>
             <a:endParaRPr lang="en-GB"/>
           </a:p>
@@ -674,7 +675,7 @@
           <a:p>
             <a:fld id="{967748FD-B821-446F-8B81-6507FBF70AB5}" type="datetimeFigureOut">
               <a:rPr lang="en-GB" smtClean="0"/>
-              <a:t>15/11/2023</a:t>
+              <a:t>16/11/2023</a:t>
             </a:fld>
             <a:endParaRPr lang="en-GB"/>
           </a:p>
@@ -874,7 +875,7 @@
           <a:p>
             <a:fld id="{967748FD-B821-446F-8B81-6507FBF70AB5}" type="datetimeFigureOut">
               <a:rPr lang="en-GB" smtClean="0"/>
-              <a:t>15/11/2023</a:t>
+              <a:t>16/11/2023</a:t>
             </a:fld>
             <a:endParaRPr lang="en-GB"/>
           </a:p>
@@ -1150,7 +1151,7 @@
           <a:p>
             <a:fld id="{967748FD-B821-446F-8B81-6507FBF70AB5}" type="datetimeFigureOut">
               <a:rPr lang="en-GB" smtClean="0"/>
-              <a:t>15/11/2023</a:t>
+              <a:t>16/11/2023</a:t>
             </a:fld>
             <a:endParaRPr lang="en-GB"/>
           </a:p>
@@ -1418,7 +1419,7 @@
           <a:p>
             <a:fld id="{967748FD-B821-446F-8B81-6507FBF70AB5}" type="datetimeFigureOut">
               <a:rPr lang="en-GB" smtClean="0"/>
-              <a:t>15/11/2023</a:t>
+              <a:t>16/11/2023</a:t>
             </a:fld>
             <a:endParaRPr lang="en-GB"/>
           </a:p>
@@ -1833,7 +1834,7 @@
           <a:p>
             <a:fld id="{967748FD-B821-446F-8B81-6507FBF70AB5}" type="datetimeFigureOut">
               <a:rPr lang="en-GB" smtClean="0"/>
-              <a:t>15/11/2023</a:t>
+              <a:t>16/11/2023</a:t>
             </a:fld>
             <a:endParaRPr lang="en-GB"/>
           </a:p>
@@ -1975,7 +1976,7 @@
           <a:p>
             <a:fld id="{967748FD-B821-446F-8B81-6507FBF70AB5}" type="datetimeFigureOut">
               <a:rPr lang="en-GB" smtClean="0"/>
-              <a:t>15/11/2023</a:t>
+              <a:t>16/11/2023</a:t>
             </a:fld>
             <a:endParaRPr lang="en-GB"/>
           </a:p>
@@ -2088,7 +2089,7 @@
           <a:p>
             <a:fld id="{967748FD-B821-446F-8B81-6507FBF70AB5}" type="datetimeFigureOut">
               <a:rPr lang="en-GB" smtClean="0"/>
-              <a:t>15/11/2023</a:t>
+              <a:t>16/11/2023</a:t>
             </a:fld>
             <a:endParaRPr lang="en-GB"/>
           </a:p>
@@ -2401,7 +2402,7 @@
           <a:p>
             <a:fld id="{967748FD-B821-446F-8B81-6507FBF70AB5}" type="datetimeFigureOut">
               <a:rPr lang="en-GB" smtClean="0"/>
-              <a:t>15/11/2023</a:t>
+              <a:t>16/11/2023</a:t>
             </a:fld>
             <a:endParaRPr lang="en-GB"/>
           </a:p>
@@ -2690,7 +2691,7 @@
           <a:p>
             <a:fld id="{967748FD-B821-446F-8B81-6507FBF70AB5}" type="datetimeFigureOut">
               <a:rPr lang="en-GB" smtClean="0"/>
-              <a:t>15/11/2023</a:t>
+              <a:t>16/11/2023</a:t>
             </a:fld>
             <a:endParaRPr lang="en-GB"/>
           </a:p>
@@ -2933,7 +2934,7 @@
           <a:p>
             <a:fld id="{967748FD-B821-446F-8B81-6507FBF70AB5}" type="datetimeFigureOut">
               <a:rPr lang="en-GB" smtClean="0"/>
-              <a:t>15/11/2023</a:t>
+              <a:t>16/11/2023</a:t>
             </a:fld>
             <a:endParaRPr lang="en-GB"/>
           </a:p>
@@ -5097,6 +5098,1886 @@
 </p:sld>
 </file>
 
+<file path=ppt/slides/slide5.xml><?xml version="1.0" encoding="utf-8"?>
+<p:sld xmlns:a="http://schemas.openxmlformats.org/drawingml/2006/main" xmlns:r="http://schemas.openxmlformats.org/officeDocument/2006/relationships" xmlns:p="http://schemas.openxmlformats.org/presentationml/2006/main">
+  <p:cSld>
+    <p:spTree>
+      <p:nvGrpSpPr>
+        <p:cNvPr id="1" name=""/>
+        <p:cNvGrpSpPr/>
+        <p:nvPr/>
+      </p:nvGrpSpPr>
+      <p:grpSpPr>
+        <a:xfrm>
+          <a:off x="0" y="0"/>
+          <a:ext cx="0" cy="0"/>
+          <a:chOff x="0" y="0"/>
+          <a:chExt cx="0" cy="0"/>
+        </a:xfrm>
+      </p:grpSpPr>
+      <p:sp>
+        <p:nvSpPr>
+          <p:cNvPr id="4" name="Rectangle 3">
+            <a:extLst>
+              <a:ext uri="{FF2B5EF4-FFF2-40B4-BE49-F238E27FC236}">
+                <a16:creationId xmlns:a16="http://schemas.microsoft.com/office/drawing/2014/main" id="{5A486437-DE91-5D8F-98F8-3BCFDF1C1B0B}"/>
+              </a:ext>
+            </a:extLst>
+          </p:cNvPr>
+          <p:cNvSpPr/>
+          <p:nvPr/>
+        </p:nvSpPr>
+        <p:spPr>
+          <a:xfrm>
+            <a:off x="855676" y="3103926"/>
+            <a:ext cx="763399" cy="713064"/>
+          </a:xfrm>
+          <a:prstGeom prst="rect">
+            <a:avLst/>
+          </a:prstGeom>
+        </p:spPr>
+        <p:style>
+          <a:lnRef idx="2">
+            <a:schemeClr val="accent6">
+              <a:shade val="15000"/>
+            </a:schemeClr>
+          </a:lnRef>
+          <a:fillRef idx="1">
+            <a:schemeClr val="accent6"/>
+          </a:fillRef>
+          <a:effectRef idx="0">
+            <a:schemeClr val="accent6"/>
+          </a:effectRef>
+          <a:fontRef idx="minor">
+            <a:schemeClr val="lt1"/>
+          </a:fontRef>
+        </p:style>
+        <p:txBody>
+          <a:bodyPr rtlCol="0" anchor="ctr"/>
+          <a:lstStyle/>
+          <a:p>
+            <a:pPr algn="ctr"/>
+            <a:r>
+              <a:rPr lang="en-US" dirty="0"/>
+              <a:t>k8x</a:t>
+            </a:r>
+            <a:endParaRPr lang="en-GB" dirty="0"/>
+          </a:p>
+        </p:txBody>
+      </p:sp>
+      <p:sp>
+        <p:nvSpPr>
+          <p:cNvPr id="5" name="Rectangle 4">
+            <a:extLst>
+              <a:ext uri="{FF2B5EF4-FFF2-40B4-BE49-F238E27FC236}">
+                <a16:creationId xmlns:a16="http://schemas.microsoft.com/office/drawing/2014/main" id="{F5298775-1ADC-378C-B4F9-FAA9B5658C64}"/>
+              </a:ext>
+            </a:extLst>
+          </p:cNvPr>
+          <p:cNvSpPr/>
+          <p:nvPr/>
+        </p:nvSpPr>
+        <p:spPr>
+          <a:xfrm>
+            <a:off x="855676" y="4135772"/>
+            <a:ext cx="763399" cy="713064"/>
+          </a:xfrm>
+          <a:prstGeom prst="rect">
+            <a:avLst/>
+          </a:prstGeom>
+        </p:spPr>
+        <p:style>
+          <a:lnRef idx="2">
+            <a:schemeClr val="accent1">
+              <a:shade val="15000"/>
+            </a:schemeClr>
+          </a:lnRef>
+          <a:fillRef idx="1">
+            <a:schemeClr val="accent1"/>
+          </a:fillRef>
+          <a:effectRef idx="0">
+            <a:schemeClr val="accent1"/>
+          </a:effectRef>
+          <a:fontRef idx="minor">
+            <a:schemeClr val="lt1"/>
+          </a:fontRef>
+        </p:style>
+        <p:txBody>
+          <a:bodyPr rtlCol="0" anchor="ctr"/>
+          <a:lstStyle/>
+          <a:p>
+            <a:pPr algn="ctr"/>
+            <a:r>
+              <a:rPr lang="en-US" sz="1200" dirty="0"/>
+              <a:t>Service 1</a:t>
+            </a:r>
+            <a:endParaRPr lang="en-GB" sz="1200" dirty="0"/>
+          </a:p>
+        </p:txBody>
+      </p:sp>
+      <p:sp>
+        <p:nvSpPr>
+          <p:cNvPr id="6" name="Rectangle 5">
+            <a:extLst>
+              <a:ext uri="{FF2B5EF4-FFF2-40B4-BE49-F238E27FC236}">
+                <a16:creationId xmlns:a16="http://schemas.microsoft.com/office/drawing/2014/main" id="{23C8BA05-8EC4-8366-6A28-77F186CF800B}"/>
+              </a:ext>
+            </a:extLst>
+          </p:cNvPr>
+          <p:cNvSpPr/>
+          <p:nvPr/>
+        </p:nvSpPr>
+        <p:spPr>
+          <a:xfrm>
+            <a:off x="1739316" y="4135772"/>
+            <a:ext cx="763399" cy="713064"/>
+          </a:xfrm>
+          <a:prstGeom prst="rect">
+            <a:avLst/>
+          </a:prstGeom>
+        </p:spPr>
+        <p:style>
+          <a:lnRef idx="2">
+            <a:schemeClr val="accent1">
+              <a:shade val="15000"/>
+            </a:schemeClr>
+          </a:lnRef>
+          <a:fillRef idx="1">
+            <a:schemeClr val="accent1"/>
+          </a:fillRef>
+          <a:effectRef idx="0">
+            <a:schemeClr val="accent1"/>
+          </a:effectRef>
+          <a:fontRef idx="minor">
+            <a:schemeClr val="lt1"/>
+          </a:fontRef>
+        </p:style>
+        <p:txBody>
+          <a:bodyPr rtlCol="0" anchor="ctr"/>
+          <a:lstStyle/>
+          <a:p>
+            <a:pPr algn="ctr"/>
+            <a:r>
+              <a:rPr lang="en-US" sz="1200" dirty="0"/>
+              <a:t>Service 1</a:t>
+            </a:r>
+            <a:endParaRPr lang="en-GB" sz="1200" dirty="0"/>
+          </a:p>
+        </p:txBody>
+      </p:sp>
+      <p:sp>
+        <p:nvSpPr>
+          <p:cNvPr id="7" name="Rectangle 6">
+            <a:extLst>
+              <a:ext uri="{FF2B5EF4-FFF2-40B4-BE49-F238E27FC236}">
+                <a16:creationId xmlns:a16="http://schemas.microsoft.com/office/drawing/2014/main" id="{8BEB3220-7B6A-A0A4-4EDB-EFDDD9F9B429}"/>
+              </a:ext>
+            </a:extLst>
+          </p:cNvPr>
+          <p:cNvSpPr/>
+          <p:nvPr/>
+        </p:nvSpPr>
+        <p:spPr>
+          <a:xfrm>
+            <a:off x="855676" y="4899169"/>
+            <a:ext cx="763399" cy="713064"/>
+          </a:xfrm>
+          <a:prstGeom prst="rect">
+            <a:avLst/>
+          </a:prstGeom>
+        </p:spPr>
+        <p:style>
+          <a:lnRef idx="2">
+            <a:schemeClr val="accent1">
+              <a:shade val="15000"/>
+            </a:schemeClr>
+          </a:lnRef>
+          <a:fillRef idx="1">
+            <a:schemeClr val="accent1"/>
+          </a:fillRef>
+          <a:effectRef idx="0">
+            <a:schemeClr val="accent1"/>
+          </a:effectRef>
+          <a:fontRef idx="minor">
+            <a:schemeClr val="lt1"/>
+          </a:fontRef>
+        </p:style>
+        <p:txBody>
+          <a:bodyPr rtlCol="0" anchor="ctr"/>
+          <a:lstStyle/>
+          <a:p>
+            <a:pPr algn="ctr"/>
+            <a:r>
+              <a:rPr lang="en-US" sz="1100" dirty="0"/>
+              <a:t>Service 2</a:t>
+            </a:r>
+            <a:endParaRPr lang="en-GB" dirty="0"/>
+          </a:p>
+        </p:txBody>
+      </p:sp>
+      <p:sp>
+        <p:nvSpPr>
+          <p:cNvPr id="8" name="Rectangle 7">
+            <a:extLst>
+              <a:ext uri="{FF2B5EF4-FFF2-40B4-BE49-F238E27FC236}">
+                <a16:creationId xmlns:a16="http://schemas.microsoft.com/office/drawing/2014/main" id="{C89F60D1-18D7-9621-29E8-71E08106C646}"/>
+              </a:ext>
+            </a:extLst>
+          </p:cNvPr>
+          <p:cNvSpPr/>
+          <p:nvPr/>
+        </p:nvSpPr>
+        <p:spPr>
+          <a:xfrm>
+            <a:off x="1739316" y="4899169"/>
+            <a:ext cx="763399" cy="713064"/>
+          </a:xfrm>
+          <a:prstGeom prst="rect">
+            <a:avLst/>
+          </a:prstGeom>
+        </p:spPr>
+        <p:style>
+          <a:lnRef idx="2">
+            <a:schemeClr val="accent1">
+              <a:shade val="15000"/>
+            </a:schemeClr>
+          </a:lnRef>
+          <a:fillRef idx="1">
+            <a:schemeClr val="accent1"/>
+          </a:fillRef>
+          <a:effectRef idx="0">
+            <a:schemeClr val="accent1"/>
+          </a:effectRef>
+          <a:fontRef idx="minor">
+            <a:schemeClr val="lt1"/>
+          </a:fontRef>
+        </p:style>
+        <p:txBody>
+          <a:bodyPr rtlCol="0" anchor="ctr"/>
+          <a:lstStyle/>
+          <a:p>
+            <a:pPr algn="ctr"/>
+            <a:r>
+              <a:rPr lang="en-US" sz="1200" dirty="0"/>
+              <a:t>Service 2</a:t>
+            </a:r>
+            <a:endParaRPr lang="en-GB" sz="1200" dirty="0"/>
+          </a:p>
+        </p:txBody>
+      </p:sp>
+      <p:sp>
+        <p:nvSpPr>
+          <p:cNvPr id="9" name="Rectangle 8">
+            <a:extLst>
+              <a:ext uri="{FF2B5EF4-FFF2-40B4-BE49-F238E27FC236}">
+                <a16:creationId xmlns:a16="http://schemas.microsoft.com/office/drawing/2014/main" id="{83587BD6-8296-2F86-1B12-2AB0C49F109B}"/>
+              </a:ext>
+            </a:extLst>
+          </p:cNvPr>
+          <p:cNvSpPr/>
+          <p:nvPr/>
+        </p:nvSpPr>
+        <p:spPr>
+          <a:xfrm>
+            <a:off x="2611772" y="4899169"/>
+            <a:ext cx="763399" cy="713064"/>
+          </a:xfrm>
+          <a:prstGeom prst="rect">
+            <a:avLst/>
+          </a:prstGeom>
+        </p:spPr>
+        <p:style>
+          <a:lnRef idx="2">
+            <a:schemeClr val="accent1">
+              <a:shade val="15000"/>
+            </a:schemeClr>
+          </a:lnRef>
+          <a:fillRef idx="1">
+            <a:schemeClr val="accent1"/>
+          </a:fillRef>
+          <a:effectRef idx="0">
+            <a:schemeClr val="accent1"/>
+          </a:effectRef>
+          <a:fontRef idx="minor">
+            <a:schemeClr val="lt1"/>
+          </a:fontRef>
+        </p:style>
+        <p:txBody>
+          <a:bodyPr rtlCol="0" anchor="ctr"/>
+          <a:lstStyle/>
+          <a:p>
+            <a:pPr algn="ctr"/>
+            <a:r>
+              <a:rPr lang="en-US" sz="1200" dirty="0"/>
+              <a:t>Service 2</a:t>
+            </a:r>
+            <a:endParaRPr lang="en-GB" sz="1200" dirty="0"/>
+          </a:p>
+        </p:txBody>
+      </p:sp>
+      <p:sp>
+        <p:nvSpPr>
+          <p:cNvPr id="10" name="Rectangle 9">
+            <a:extLst>
+              <a:ext uri="{FF2B5EF4-FFF2-40B4-BE49-F238E27FC236}">
+                <a16:creationId xmlns:a16="http://schemas.microsoft.com/office/drawing/2014/main" id="{1B255883-220C-317D-19D1-DD854F7A91B5}"/>
+              </a:ext>
+            </a:extLst>
+          </p:cNvPr>
+          <p:cNvSpPr/>
+          <p:nvPr/>
+        </p:nvSpPr>
+        <p:spPr>
+          <a:xfrm>
+            <a:off x="3495412" y="4899169"/>
+            <a:ext cx="763399" cy="713064"/>
+          </a:xfrm>
+          <a:prstGeom prst="rect">
+            <a:avLst/>
+          </a:prstGeom>
+        </p:spPr>
+        <p:style>
+          <a:lnRef idx="2">
+            <a:schemeClr val="accent1">
+              <a:shade val="15000"/>
+            </a:schemeClr>
+          </a:lnRef>
+          <a:fillRef idx="1">
+            <a:schemeClr val="accent1"/>
+          </a:fillRef>
+          <a:effectRef idx="0">
+            <a:schemeClr val="accent1"/>
+          </a:effectRef>
+          <a:fontRef idx="minor">
+            <a:schemeClr val="lt1"/>
+          </a:fontRef>
+        </p:style>
+        <p:txBody>
+          <a:bodyPr rtlCol="0" anchor="ctr"/>
+          <a:lstStyle/>
+          <a:p>
+            <a:pPr algn="ctr"/>
+            <a:r>
+              <a:rPr lang="en-US" sz="1200" dirty="0"/>
+              <a:t>Service 2</a:t>
+            </a:r>
+            <a:endParaRPr lang="en-GB" sz="1200" dirty="0"/>
+          </a:p>
+        </p:txBody>
+      </p:sp>
+      <p:sp>
+        <p:nvSpPr>
+          <p:cNvPr id="11" name="Rectangle 10">
+            <a:extLst>
+              <a:ext uri="{FF2B5EF4-FFF2-40B4-BE49-F238E27FC236}">
+                <a16:creationId xmlns:a16="http://schemas.microsoft.com/office/drawing/2014/main" id="{6734969C-3660-D167-0941-58A46B977CD9}"/>
+              </a:ext>
+            </a:extLst>
+          </p:cNvPr>
+          <p:cNvSpPr/>
+          <p:nvPr/>
+        </p:nvSpPr>
+        <p:spPr>
+          <a:xfrm>
+            <a:off x="729842" y="2701255"/>
+            <a:ext cx="3632433" cy="1241571"/>
+          </a:xfrm>
+          <a:prstGeom prst="rect">
+            <a:avLst/>
+          </a:prstGeom>
+          <a:noFill/>
+        </p:spPr>
+        <p:style>
+          <a:lnRef idx="2">
+            <a:schemeClr val="accent1">
+              <a:shade val="15000"/>
+            </a:schemeClr>
+          </a:lnRef>
+          <a:fillRef idx="1">
+            <a:schemeClr val="accent1"/>
+          </a:fillRef>
+          <a:effectRef idx="0">
+            <a:schemeClr val="accent1"/>
+          </a:effectRef>
+          <a:fontRef idx="minor">
+            <a:schemeClr val="lt1"/>
+          </a:fontRef>
+        </p:style>
+        <p:txBody>
+          <a:bodyPr rtlCol="0" anchor="ctr"/>
+          <a:lstStyle/>
+          <a:p>
+            <a:pPr algn="ctr"/>
+            <a:endParaRPr lang="en-GB"/>
+          </a:p>
+        </p:txBody>
+      </p:sp>
+      <p:sp>
+        <p:nvSpPr>
+          <p:cNvPr id="12" name="Rectangle 11">
+            <a:extLst>
+              <a:ext uri="{FF2B5EF4-FFF2-40B4-BE49-F238E27FC236}">
+                <a16:creationId xmlns:a16="http://schemas.microsoft.com/office/drawing/2014/main" id="{4301407A-60C1-CDC1-9C0E-636E3B10540A}"/>
+              </a:ext>
+            </a:extLst>
+          </p:cNvPr>
+          <p:cNvSpPr/>
+          <p:nvPr/>
+        </p:nvSpPr>
+        <p:spPr>
+          <a:xfrm>
+            <a:off x="729842" y="4001548"/>
+            <a:ext cx="3632433" cy="1744912"/>
+          </a:xfrm>
+          <a:prstGeom prst="rect">
+            <a:avLst/>
+          </a:prstGeom>
+          <a:noFill/>
+        </p:spPr>
+        <p:style>
+          <a:lnRef idx="2">
+            <a:schemeClr val="accent1">
+              <a:shade val="15000"/>
+            </a:schemeClr>
+          </a:lnRef>
+          <a:fillRef idx="1">
+            <a:schemeClr val="accent1"/>
+          </a:fillRef>
+          <a:effectRef idx="0">
+            <a:schemeClr val="accent1"/>
+          </a:effectRef>
+          <a:fontRef idx="minor">
+            <a:schemeClr val="lt1"/>
+          </a:fontRef>
+        </p:style>
+        <p:txBody>
+          <a:bodyPr rtlCol="0" anchor="ctr"/>
+          <a:lstStyle/>
+          <a:p>
+            <a:pPr algn="ctr"/>
+            <a:endParaRPr lang="en-GB"/>
+          </a:p>
+        </p:txBody>
+      </p:sp>
+      <p:sp>
+        <p:nvSpPr>
+          <p:cNvPr id="13" name="TextBox 12">
+            <a:extLst>
+              <a:ext uri="{FF2B5EF4-FFF2-40B4-BE49-F238E27FC236}">
+                <a16:creationId xmlns:a16="http://schemas.microsoft.com/office/drawing/2014/main" id="{503FF64E-05B2-A1E4-CA59-5F3CE2E8DFDA}"/>
+              </a:ext>
+            </a:extLst>
+          </p:cNvPr>
+          <p:cNvSpPr txBox="1"/>
+          <p:nvPr/>
+        </p:nvSpPr>
+        <p:spPr>
+          <a:xfrm>
+            <a:off x="3295221" y="2709993"/>
+            <a:ext cx="1063112" cy="261610"/>
+          </a:xfrm>
+          <a:prstGeom prst="rect">
+            <a:avLst/>
+          </a:prstGeom>
+          <a:noFill/>
+        </p:spPr>
+        <p:txBody>
+          <a:bodyPr wrap="none" rtlCol="0">
+            <a:spAutoFit/>
+          </a:bodyPr>
+          <a:lstStyle/>
+          <a:p>
+            <a:r>
+              <a:rPr lang="en-US" sz="1050" dirty="0"/>
+              <a:t>k8x namespace</a:t>
+            </a:r>
+            <a:endParaRPr lang="en-GB" sz="1050" dirty="0"/>
+          </a:p>
+        </p:txBody>
+      </p:sp>
+      <p:sp>
+        <p:nvSpPr>
+          <p:cNvPr id="14" name="TextBox 13">
+            <a:extLst>
+              <a:ext uri="{FF2B5EF4-FFF2-40B4-BE49-F238E27FC236}">
+                <a16:creationId xmlns:a16="http://schemas.microsoft.com/office/drawing/2014/main" id="{99EA8429-7058-7A04-7866-E16149F4A710}"/>
+              </a:ext>
+            </a:extLst>
+          </p:cNvPr>
+          <p:cNvSpPr txBox="1"/>
+          <p:nvPr/>
+        </p:nvSpPr>
+        <p:spPr>
+          <a:xfrm>
+            <a:off x="3194050" y="4496441"/>
+            <a:ext cx="1220206" cy="253916"/>
+          </a:xfrm>
+          <a:prstGeom prst="rect">
+            <a:avLst/>
+          </a:prstGeom>
+          <a:noFill/>
+        </p:spPr>
+        <p:txBody>
+          <a:bodyPr wrap="none" rtlCol="0">
+            <a:spAutoFit/>
+          </a:bodyPr>
+          <a:lstStyle/>
+          <a:p>
+            <a:r>
+              <a:rPr lang="en-US" sz="1050" dirty="0"/>
+              <a:t>service namespace</a:t>
+            </a:r>
+            <a:endParaRPr lang="en-GB" sz="1050" dirty="0"/>
+          </a:p>
+        </p:txBody>
+      </p:sp>
+      <p:sp>
+        <p:nvSpPr>
+          <p:cNvPr id="15" name="Rectangle 14">
+            <a:extLst>
+              <a:ext uri="{FF2B5EF4-FFF2-40B4-BE49-F238E27FC236}">
+                <a16:creationId xmlns:a16="http://schemas.microsoft.com/office/drawing/2014/main" id="{33114799-E6D9-E859-C05F-9B8D0EE95D4C}"/>
+              </a:ext>
+            </a:extLst>
+          </p:cNvPr>
+          <p:cNvSpPr/>
+          <p:nvPr/>
+        </p:nvSpPr>
+        <p:spPr>
+          <a:xfrm>
+            <a:off x="1779505" y="3100508"/>
+            <a:ext cx="699082" cy="713064"/>
+          </a:xfrm>
+          <a:prstGeom prst="rect">
+            <a:avLst/>
+          </a:prstGeom>
+          <a:solidFill>
+            <a:schemeClr val="accent6">
+              <a:lumMod val="75000"/>
+            </a:schemeClr>
+          </a:solidFill>
+        </p:spPr>
+        <p:style>
+          <a:lnRef idx="2">
+            <a:schemeClr val="accent6">
+              <a:shade val="15000"/>
+            </a:schemeClr>
+          </a:lnRef>
+          <a:fillRef idx="1">
+            <a:schemeClr val="accent6"/>
+          </a:fillRef>
+          <a:effectRef idx="0">
+            <a:schemeClr val="accent6"/>
+          </a:effectRef>
+          <a:fontRef idx="minor">
+            <a:schemeClr val="lt1"/>
+          </a:fontRef>
+        </p:style>
+        <p:txBody>
+          <a:bodyPr rtlCol="0" anchor="ctr"/>
+          <a:lstStyle/>
+          <a:p>
+            <a:pPr algn="ctr"/>
+            <a:r>
+              <a:rPr lang="en-US" sz="1050" dirty="0"/>
+              <a:t>Service Account</a:t>
+            </a:r>
+            <a:endParaRPr lang="en-GB" sz="1050" dirty="0"/>
+          </a:p>
+        </p:txBody>
+      </p:sp>
+      <p:sp>
+        <p:nvSpPr>
+          <p:cNvPr id="16" name="Rectangle 15">
+            <a:extLst>
+              <a:ext uri="{FF2B5EF4-FFF2-40B4-BE49-F238E27FC236}">
+                <a16:creationId xmlns:a16="http://schemas.microsoft.com/office/drawing/2014/main" id="{4D40F5B0-63F1-478E-2504-2A0086076E8F}"/>
+              </a:ext>
+            </a:extLst>
+          </p:cNvPr>
+          <p:cNvSpPr/>
+          <p:nvPr/>
+        </p:nvSpPr>
+        <p:spPr>
+          <a:xfrm>
+            <a:off x="3454612" y="3092118"/>
+            <a:ext cx="699082" cy="713064"/>
+          </a:xfrm>
+          <a:prstGeom prst="rect">
+            <a:avLst/>
+          </a:prstGeom>
+          <a:solidFill>
+            <a:schemeClr val="accent6">
+              <a:lumMod val="75000"/>
+            </a:schemeClr>
+          </a:solidFill>
+        </p:spPr>
+        <p:style>
+          <a:lnRef idx="2">
+            <a:schemeClr val="accent1">
+              <a:shade val="15000"/>
+            </a:schemeClr>
+          </a:lnRef>
+          <a:fillRef idx="1">
+            <a:schemeClr val="accent1"/>
+          </a:fillRef>
+          <a:effectRef idx="0">
+            <a:schemeClr val="accent1"/>
+          </a:effectRef>
+          <a:fontRef idx="minor">
+            <a:schemeClr val="lt1"/>
+          </a:fontRef>
+        </p:style>
+        <p:txBody>
+          <a:bodyPr rtlCol="0" anchor="ctr"/>
+          <a:lstStyle/>
+          <a:p>
+            <a:pPr algn="ctr"/>
+            <a:r>
+              <a:rPr lang="en-US" sz="1050" dirty="0"/>
+              <a:t>Role</a:t>
+            </a:r>
+            <a:endParaRPr lang="en-GB" sz="1050" dirty="0"/>
+          </a:p>
+        </p:txBody>
+      </p:sp>
+      <p:sp>
+        <p:nvSpPr>
+          <p:cNvPr id="17" name="Rectangle 16">
+            <a:extLst>
+              <a:ext uri="{FF2B5EF4-FFF2-40B4-BE49-F238E27FC236}">
+                <a16:creationId xmlns:a16="http://schemas.microsoft.com/office/drawing/2014/main" id="{36EAB07C-2636-8D26-F745-675F3B2F093E}"/>
+              </a:ext>
+            </a:extLst>
+          </p:cNvPr>
+          <p:cNvSpPr/>
+          <p:nvPr/>
+        </p:nvSpPr>
+        <p:spPr>
+          <a:xfrm>
+            <a:off x="2631529" y="3100508"/>
+            <a:ext cx="699082" cy="713064"/>
+          </a:xfrm>
+          <a:prstGeom prst="rect">
+            <a:avLst/>
+          </a:prstGeom>
+          <a:solidFill>
+            <a:schemeClr val="accent6">
+              <a:lumMod val="75000"/>
+            </a:schemeClr>
+          </a:solidFill>
+        </p:spPr>
+        <p:style>
+          <a:lnRef idx="2">
+            <a:schemeClr val="accent1">
+              <a:shade val="15000"/>
+            </a:schemeClr>
+          </a:lnRef>
+          <a:fillRef idx="1">
+            <a:schemeClr val="accent1"/>
+          </a:fillRef>
+          <a:effectRef idx="0">
+            <a:schemeClr val="accent1"/>
+          </a:effectRef>
+          <a:fontRef idx="minor">
+            <a:schemeClr val="lt1"/>
+          </a:fontRef>
+        </p:style>
+        <p:txBody>
+          <a:bodyPr rtlCol="0" anchor="ctr"/>
+          <a:lstStyle/>
+          <a:p>
+            <a:pPr algn="ctr"/>
+            <a:r>
+              <a:rPr lang="en-US" sz="1050" dirty="0"/>
+              <a:t>Role Binding</a:t>
+            </a:r>
+            <a:endParaRPr lang="en-GB" sz="1050" dirty="0"/>
+          </a:p>
+        </p:txBody>
+      </p:sp>
+      <p:pic>
+        <p:nvPicPr>
+          <p:cNvPr id="1026" name="Picture 2">
+            <a:extLst>
+              <a:ext uri="{FF2B5EF4-FFF2-40B4-BE49-F238E27FC236}">
+                <a16:creationId xmlns:a16="http://schemas.microsoft.com/office/drawing/2014/main" id="{9BC5AD39-3400-FCBF-C96B-9B94C29DA5DF}"/>
+              </a:ext>
+            </a:extLst>
+          </p:cNvPr>
+          <p:cNvPicPr>
+            <a:picLocks noChangeAspect="1" noChangeArrowheads="1"/>
+          </p:cNvPicPr>
+          <p:nvPr/>
+        </p:nvPicPr>
+        <p:blipFill>
+          <a:blip r:embed="rId2">
+            <a:extLst>
+              <a:ext uri="{28A0092B-C50C-407E-A947-70E740481C1C}">
+                <a14:useLocalDpi xmlns:a14="http://schemas.microsoft.com/office/drawing/2010/main" val="0"/>
+              </a:ext>
+            </a:extLst>
+          </a:blip>
+          <a:srcRect/>
+          <a:stretch>
+            <a:fillRect/>
+          </a:stretch>
+        </p:blipFill>
+        <p:spPr bwMode="auto">
+          <a:xfrm>
+            <a:off x="2093530" y="833198"/>
+            <a:ext cx="770113" cy="763398"/>
+          </a:xfrm>
+          <a:prstGeom prst="rect">
+            <a:avLst/>
+          </a:prstGeom>
+          <a:noFill/>
+          <a:extLst>
+            <a:ext uri="{909E8E84-426E-40DD-AFC4-6F175D3DCCD1}">
+              <a14:hiddenFill xmlns:a14="http://schemas.microsoft.com/office/drawing/2010/main">
+                <a:solidFill>
+                  <a:srgbClr val="FFFFFF"/>
+                </a:solidFill>
+              </a14:hiddenFill>
+            </a:ext>
+          </a:extLst>
+        </p:spPr>
+      </p:pic>
+      <p:pic>
+        <p:nvPicPr>
+          <p:cNvPr id="1028" name="Picture 4">
+            <a:extLst>
+              <a:ext uri="{FF2B5EF4-FFF2-40B4-BE49-F238E27FC236}">
+                <a16:creationId xmlns:a16="http://schemas.microsoft.com/office/drawing/2014/main" id="{60F1826B-E8FE-4C07-9A2F-AE29B4DB590F}"/>
+              </a:ext>
+            </a:extLst>
+          </p:cNvPr>
+          <p:cNvPicPr>
+            <a:picLocks noChangeAspect="1" noChangeArrowheads="1"/>
+          </p:cNvPicPr>
+          <p:nvPr/>
+        </p:nvPicPr>
+        <p:blipFill>
+          <a:blip r:embed="rId3">
+            <a:extLst>
+              <a:ext uri="{28A0092B-C50C-407E-A947-70E740481C1C}">
+                <a14:useLocalDpi xmlns:a14="http://schemas.microsoft.com/office/drawing/2010/main" val="0"/>
+              </a:ext>
+            </a:extLst>
+          </a:blip>
+          <a:srcRect/>
+          <a:stretch>
+            <a:fillRect/>
+          </a:stretch>
+        </p:blipFill>
+        <p:spPr bwMode="auto">
+          <a:xfrm>
+            <a:off x="7525964" y="740329"/>
+            <a:ext cx="1047470" cy="949136"/>
+          </a:xfrm>
+          <a:prstGeom prst="rect">
+            <a:avLst/>
+          </a:prstGeom>
+          <a:noFill/>
+          <a:extLst>
+            <a:ext uri="{909E8E84-426E-40DD-AFC4-6F175D3DCCD1}">
+              <a14:hiddenFill xmlns:a14="http://schemas.microsoft.com/office/drawing/2010/main">
+                <a:solidFill>
+                  <a:srgbClr val="FFFFFF"/>
+                </a:solidFill>
+              </a14:hiddenFill>
+            </a:ext>
+          </a:extLst>
+        </p:spPr>
+      </p:pic>
+      <p:pic>
+        <p:nvPicPr>
+          <p:cNvPr id="1030" name="Picture 6">
+            <a:extLst>
+              <a:ext uri="{FF2B5EF4-FFF2-40B4-BE49-F238E27FC236}">
+                <a16:creationId xmlns:a16="http://schemas.microsoft.com/office/drawing/2014/main" id="{93C8C13A-0FF1-1707-5EA6-671814F5181A}"/>
+              </a:ext>
+            </a:extLst>
+          </p:cNvPr>
+          <p:cNvPicPr>
+            <a:picLocks noChangeAspect="1" noChangeArrowheads="1"/>
+          </p:cNvPicPr>
+          <p:nvPr/>
+        </p:nvPicPr>
+        <p:blipFill>
+          <a:blip r:embed="rId4">
+            <a:extLst>
+              <a:ext uri="{28A0092B-C50C-407E-A947-70E740481C1C}">
+                <a14:useLocalDpi xmlns:a14="http://schemas.microsoft.com/office/drawing/2010/main" val="0"/>
+              </a:ext>
+            </a:extLst>
+          </a:blip>
+          <a:srcRect/>
+          <a:stretch>
+            <a:fillRect/>
+          </a:stretch>
+        </p:blipFill>
+        <p:spPr bwMode="auto">
+          <a:xfrm>
+            <a:off x="7655893" y="2709993"/>
+            <a:ext cx="787612" cy="787612"/>
+          </a:xfrm>
+          <a:prstGeom prst="rect">
+            <a:avLst/>
+          </a:prstGeom>
+          <a:noFill/>
+          <a:extLst>
+            <a:ext uri="{909E8E84-426E-40DD-AFC4-6F175D3DCCD1}">
+              <a14:hiddenFill xmlns:a14="http://schemas.microsoft.com/office/drawing/2010/main">
+                <a:solidFill>
+                  <a:srgbClr val="FFFFFF"/>
+                </a:solidFill>
+              </a14:hiddenFill>
+            </a:ext>
+          </a:extLst>
+        </p:spPr>
+      </p:pic>
+      <p:pic>
+        <p:nvPicPr>
+          <p:cNvPr id="18" name="Picture 6">
+            <a:extLst>
+              <a:ext uri="{FF2B5EF4-FFF2-40B4-BE49-F238E27FC236}">
+                <a16:creationId xmlns:a16="http://schemas.microsoft.com/office/drawing/2014/main" id="{696FDEFD-9483-AAC3-2070-26FAC92DA759}"/>
+              </a:ext>
+            </a:extLst>
+          </p:cNvPr>
+          <p:cNvPicPr>
+            <a:picLocks noChangeAspect="1" noChangeArrowheads="1"/>
+          </p:cNvPicPr>
+          <p:nvPr/>
+        </p:nvPicPr>
+        <p:blipFill>
+          <a:blip r:embed="rId4">
+            <a:extLst>
+              <a:ext uri="{28A0092B-C50C-407E-A947-70E740481C1C}">
+                <a14:useLocalDpi xmlns:a14="http://schemas.microsoft.com/office/drawing/2010/main" val="0"/>
+              </a:ext>
+            </a:extLst>
+          </a:blip>
+          <a:srcRect/>
+          <a:stretch>
+            <a:fillRect/>
+          </a:stretch>
+        </p:blipFill>
+        <p:spPr bwMode="auto">
+          <a:xfrm>
+            <a:off x="7655893" y="4217785"/>
+            <a:ext cx="787612" cy="787612"/>
+          </a:xfrm>
+          <a:prstGeom prst="rect">
+            <a:avLst/>
+          </a:prstGeom>
+          <a:noFill/>
+          <a:extLst>
+            <a:ext uri="{909E8E84-426E-40DD-AFC4-6F175D3DCCD1}">
+              <a14:hiddenFill xmlns:a14="http://schemas.microsoft.com/office/drawing/2010/main">
+                <a:solidFill>
+                  <a:srgbClr val="FFFFFF"/>
+                </a:solidFill>
+              </a14:hiddenFill>
+            </a:ext>
+          </a:extLst>
+        </p:spPr>
+      </p:pic>
+      <p:pic>
+        <p:nvPicPr>
+          <p:cNvPr id="1032" name="Picture 8">
+            <a:extLst>
+              <a:ext uri="{FF2B5EF4-FFF2-40B4-BE49-F238E27FC236}">
+                <a16:creationId xmlns:a16="http://schemas.microsoft.com/office/drawing/2014/main" id="{676F3696-1F92-BB6A-745C-760AE3BF272F}"/>
+              </a:ext>
+            </a:extLst>
+          </p:cNvPr>
+          <p:cNvPicPr>
+            <a:picLocks noChangeAspect="1" noChangeArrowheads="1"/>
+          </p:cNvPicPr>
+          <p:nvPr/>
+        </p:nvPicPr>
+        <p:blipFill>
+          <a:blip r:embed="rId5">
+            <a:extLst>
+              <a:ext uri="{28A0092B-C50C-407E-A947-70E740481C1C}">
+                <a14:useLocalDpi xmlns:a14="http://schemas.microsoft.com/office/drawing/2010/main" val="0"/>
+              </a:ext>
+            </a:extLst>
+          </a:blip>
+          <a:srcRect/>
+          <a:stretch>
+            <a:fillRect/>
+          </a:stretch>
+        </p:blipFill>
+        <p:spPr bwMode="auto">
+          <a:xfrm>
+            <a:off x="9624883" y="3342444"/>
+            <a:ext cx="787612" cy="942255"/>
+          </a:xfrm>
+          <a:prstGeom prst="rect">
+            <a:avLst/>
+          </a:prstGeom>
+          <a:noFill/>
+          <a:extLst>
+            <a:ext uri="{909E8E84-426E-40DD-AFC4-6F175D3DCCD1}">
+              <a14:hiddenFill xmlns:a14="http://schemas.microsoft.com/office/drawing/2010/main">
+                <a:solidFill>
+                  <a:srgbClr val="FFFFFF"/>
+                </a:solidFill>
+              </a14:hiddenFill>
+            </a:ext>
+          </a:extLst>
+        </p:spPr>
+      </p:pic>
+      <p:sp>
+        <p:nvSpPr>
+          <p:cNvPr id="24" name="TextBox 23">
+            <a:extLst>
+              <a:ext uri="{FF2B5EF4-FFF2-40B4-BE49-F238E27FC236}">
+                <a16:creationId xmlns:a16="http://schemas.microsoft.com/office/drawing/2014/main" id="{E4EF59A8-2891-15F6-5F3C-B841DE8B6597}"/>
+              </a:ext>
+            </a:extLst>
+          </p:cNvPr>
+          <p:cNvSpPr txBox="1"/>
+          <p:nvPr/>
+        </p:nvSpPr>
+        <p:spPr>
+          <a:xfrm>
+            <a:off x="1902839" y="1558912"/>
+            <a:ext cx="1199752" cy="338554"/>
+          </a:xfrm>
+          <a:prstGeom prst="rect">
+            <a:avLst/>
+          </a:prstGeom>
+          <a:noFill/>
+        </p:spPr>
+        <p:txBody>
+          <a:bodyPr wrap="none" rtlCol="0">
+            <a:spAutoFit/>
+          </a:bodyPr>
+          <a:lstStyle/>
+          <a:p>
+            <a:r>
+              <a:rPr lang="en-US" sz="1600" dirty="0"/>
+              <a:t>Prometheus</a:t>
+            </a:r>
+            <a:endParaRPr lang="en-GB" sz="1600" dirty="0"/>
+          </a:p>
+        </p:txBody>
+      </p:sp>
+      <p:sp>
+        <p:nvSpPr>
+          <p:cNvPr id="25" name="TextBox 24">
+            <a:extLst>
+              <a:ext uri="{FF2B5EF4-FFF2-40B4-BE49-F238E27FC236}">
+                <a16:creationId xmlns:a16="http://schemas.microsoft.com/office/drawing/2014/main" id="{36AB7D36-6289-CB15-A11C-2B53430BBB58}"/>
+              </a:ext>
+            </a:extLst>
+          </p:cNvPr>
+          <p:cNvSpPr txBox="1"/>
+          <p:nvPr/>
+        </p:nvSpPr>
+        <p:spPr>
+          <a:xfrm>
+            <a:off x="7489289" y="1651259"/>
+            <a:ext cx="1120820" cy="338554"/>
+          </a:xfrm>
+          <a:prstGeom prst="rect">
+            <a:avLst/>
+          </a:prstGeom>
+          <a:noFill/>
+        </p:spPr>
+        <p:txBody>
+          <a:bodyPr wrap="none" rtlCol="0">
+            <a:spAutoFit/>
+          </a:bodyPr>
+          <a:lstStyle/>
+          <a:p>
+            <a:r>
+              <a:rPr lang="en-US" sz="1600" dirty="0"/>
+              <a:t>DynamoDB</a:t>
+            </a:r>
+            <a:endParaRPr lang="en-GB" sz="1600" dirty="0"/>
+          </a:p>
+        </p:txBody>
+      </p:sp>
+      <p:sp>
+        <p:nvSpPr>
+          <p:cNvPr id="26" name="TextBox 25">
+            <a:extLst>
+              <a:ext uri="{FF2B5EF4-FFF2-40B4-BE49-F238E27FC236}">
+                <a16:creationId xmlns:a16="http://schemas.microsoft.com/office/drawing/2014/main" id="{992B3FB4-6613-12A7-266F-F800074E326C}"/>
+              </a:ext>
+            </a:extLst>
+          </p:cNvPr>
+          <p:cNvSpPr txBox="1"/>
+          <p:nvPr/>
+        </p:nvSpPr>
+        <p:spPr>
+          <a:xfrm>
+            <a:off x="7330784" y="3497605"/>
+            <a:ext cx="1437830" cy="338554"/>
+          </a:xfrm>
+          <a:prstGeom prst="rect">
+            <a:avLst/>
+          </a:prstGeom>
+          <a:noFill/>
+        </p:spPr>
+        <p:txBody>
+          <a:bodyPr wrap="none" rtlCol="0">
+            <a:spAutoFit/>
+          </a:bodyPr>
+          <a:lstStyle/>
+          <a:p>
+            <a:r>
+              <a:rPr lang="en-US" sz="1600" dirty="0"/>
+              <a:t>Create Lambda</a:t>
+            </a:r>
+            <a:endParaRPr lang="en-GB" sz="1600" dirty="0"/>
+          </a:p>
+        </p:txBody>
+      </p:sp>
+      <p:sp>
+        <p:nvSpPr>
+          <p:cNvPr id="27" name="TextBox 26">
+            <a:extLst>
+              <a:ext uri="{FF2B5EF4-FFF2-40B4-BE49-F238E27FC236}">
+                <a16:creationId xmlns:a16="http://schemas.microsoft.com/office/drawing/2014/main" id="{3BD52800-8607-C636-CBCF-18C6C42FAF20}"/>
+              </a:ext>
+            </a:extLst>
+          </p:cNvPr>
+          <p:cNvSpPr txBox="1"/>
+          <p:nvPr/>
+        </p:nvSpPr>
+        <p:spPr>
+          <a:xfrm>
+            <a:off x="7310297" y="5014913"/>
+            <a:ext cx="1478803" cy="338554"/>
+          </a:xfrm>
+          <a:prstGeom prst="rect">
+            <a:avLst/>
+          </a:prstGeom>
+          <a:noFill/>
+        </p:spPr>
+        <p:txBody>
+          <a:bodyPr wrap="none" rtlCol="0">
+            <a:spAutoFit/>
+          </a:bodyPr>
+          <a:lstStyle/>
+          <a:p>
+            <a:r>
+              <a:rPr lang="en-US" sz="1600" dirty="0"/>
+              <a:t>Predict Lambda</a:t>
+            </a:r>
+            <a:endParaRPr lang="en-GB" sz="1600" dirty="0"/>
+          </a:p>
+        </p:txBody>
+      </p:sp>
+      <p:sp>
+        <p:nvSpPr>
+          <p:cNvPr id="28" name="TextBox 27">
+            <a:extLst>
+              <a:ext uri="{FF2B5EF4-FFF2-40B4-BE49-F238E27FC236}">
+                <a16:creationId xmlns:a16="http://schemas.microsoft.com/office/drawing/2014/main" id="{45463A77-3C20-B493-BEF8-097FFAA552A7}"/>
+              </a:ext>
+            </a:extLst>
+          </p:cNvPr>
+          <p:cNvSpPr txBox="1"/>
+          <p:nvPr/>
+        </p:nvSpPr>
+        <p:spPr>
+          <a:xfrm>
+            <a:off x="9274607" y="4323027"/>
+            <a:ext cx="1459182" cy="338554"/>
+          </a:xfrm>
+          <a:prstGeom prst="rect">
+            <a:avLst/>
+          </a:prstGeom>
+          <a:noFill/>
+        </p:spPr>
+        <p:txBody>
+          <a:bodyPr wrap="none" rtlCol="0">
+            <a:spAutoFit/>
+          </a:bodyPr>
+          <a:lstStyle/>
+          <a:p>
+            <a:r>
+              <a:rPr lang="en-US" sz="1600" dirty="0"/>
+              <a:t>S3 Model Store</a:t>
+            </a:r>
+            <a:endParaRPr lang="en-GB" sz="1600" dirty="0"/>
+          </a:p>
+        </p:txBody>
+      </p:sp>
+      <p:sp>
+        <p:nvSpPr>
+          <p:cNvPr id="29" name="Rectangle 28">
+            <a:extLst>
+              <a:ext uri="{FF2B5EF4-FFF2-40B4-BE49-F238E27FC236}">
+                <a16:creationId xmlns:a16="http://schemas.microsoft.com/office/drawing/2014/main" id="{5BAC91F9-4F26-861A-BD6F-586B203C7792}"/>
+              </a:ext>
+            </a:extLst>
+          </p:cNvPr>
+          <p:cNvSpPr/>
+          <p:nvPr/>
+        </p:nvSpPr>
+        <p:spPr>
+          <a:xfrm>
+            <a:off x="6467912" y="595618"/>
+            <a:ext cx="4639112" cy="5016615"/>
+          </a:xfrm>
+          <a:prstGeom prst="rect">
+            <a:avLst/>
+          </a:prstGeom>
+          <a:noFill/>
+        </p:spPr>
+        <p:style>
+          <a:lnRef idx="2">
+            <a:schemeClr val="accent1">
+              <a:shade val="15000"/>
+            </a:schemeClr>
+          </a:lnRef>
+          <a:fillRef idx="1">
+            <a:schemeClr val="accent1"/>
+          </a:fillRef>
+          <a:effectRef idx="0">
+            <a:schemeClr val="accent1"/>
+          </a:effectRef>
+          <a:fontRef idx="minor">
+            <a:schemeClr val="lt1"/>
+          </a:fontRef>
+        </p:style>
+        <p:txBody>
+          <a:bodyPr rtlCol="0" anchor="ctr"/>
+          <a:lstStyle/>
+          <a:p>
+            <a:pPr algn="ctr"/>
+            <a:endParaRPr lang="en-GB"/>
+          </a:p>
+        </p:txBody>
+      </p:sp>
+      <p:sp>
+        <p:nvSpPr>
+          <p:cNvPr id="30" name="TextBox 29">
+            <a:extLst>
+              <a:ext uri="{FF2B5EF4-FFF2-40B4-BE49-F238E27FC236}">
+                <a16:creationId xmlns:a16="http://schemas.microsoft.com/office/drawing/2014/main" id="{29E45D6D-EDE7-78D8-AF8B-AFAE9EF8F90E}"/>
+              </a:ext>
+            </a:extLst>
+          </p:cNvPr>
+          <p:cNvSpPr txBox="1"/>
+          <p:nvPr/>
+        </p:nvSpPr>
+        <p:spPr>
+          <a:xfrm>
+            <a:off x="9631341" y="590630"/>
+            <a:ext cx="1483291" cy="369332"/>
+          </a:xfrm>
+          <a:prstGeom prst="rect">
+            <a:avLst/>
+          </a:prstGeom>
+          <a:noFill/>
+        </p:spPr>
+        <p:txBody>
+          <a:bodyPr wrap="none" rtlCol="0">
+            <a:spAutoFit/>
+          </a:bodyPr>
+          <a:lstStyle/>
+          <a:p>
+            <a:r>
+              <a:rPr lang="en-US" dirty="0"/>
+              <a:t>1 AWS Region</a:t>
+            </a:r>
+            <a:endParaRPr lang="en-GB" dirty="0"/>
+          </a:p>
+        </p:txBody>
+      </p:sp>
+      <p:cxnSp>
+        <p:nvCxnSpPr>
+          <p:cNvPr id="32" name="Straight Arrow Connector 31">
+            <a:extLst>
+              <a:ext uri="{FF2B5EF4-FFF2-40B4-BE49-F238E27FC236}">
+                <a16:creationId xmlns:a16="http://schemas.microsoft.com/office/drawing/2014/main" id="{7FEDFAEB-0383-709C-06AD-8E07A5CE3DE5}"/>
+              </a:ext>
+            </a:extLst>
+          </p:cNvPr>
+          <p:cNvCxnSpPr>
+            <a:stCxn id="24" idx="2"/>
+            <a:endCxn id="4" idx="0"/>
+          </p:cNvCxnSpPr>
+          <p:nvPr/>
+        </p:nvCxnSpPr>
+        <p:spPr>
+          <a:xfrm flipH="1">
+            <a:off x="1237376" y="1897466"/>
+            <a:ext cx="1265339" cy="1206460"/>
+          </a:xfrm>
+          <a:prstGeom prst="straightConnector1">
+            <a:avLst/>
+          </a:prstGeom>
+          <a:ln>
+            <a:tailEnd type="triangle"/>
+          </a:ln>
+        </p:spPr>
+        <p:style>
+          <a:lnRef idx="1">
+            <a:schemeClr val="accent1"/>
+          </a:lnRef>
+          <a:fillRef idx="0">
+            <a:schemeClr val="accent1"/>
+          </a:fillRef>
+          <a:effectRef idx="0">
+            <a:schemeClr val="accent1"/>
+          </a:effectRef>
+          <a:fontRef idx="minor">
+            <a:schemeClr val="tx1"/>
+          </a:fontRef>
+        </p:style>
+      </p:cxnSp>
+      <p:cxnSp>
+        <p:nvCxnSpPr>
+          <p:cNvPr id="34" name="Straight Arrow Connector 33">
+            <a:extLst>
+              <a:ext uri="{FF2B5EF4-FFF2-40B4-BE49-F238E27FC236}">
+                <a16:creationId xmlns:a16="http://schemas.microsoft.com/office/drawing/2014/main" id="{C98BDABF-9FBC-3DC6-510F-72924B1574C5}"/>
+              </a:ext>
+            </a:extLst>
+          </p:cNvPr>
+          <p:cNvCxnSpPr>
+            <a:stCxn id="4" idx="0"/>
+            <a:endCxn id="1028" idx="1"/>
+          </p:cNvCxnSpPr>
+          <p:nvPr/>
+        </p:nvCxnSpPr>
+        <p:spPr>
+          <a:xfrm flipV="1">
+            <a:off x="1237376" y="1214897"/>
+            <a:ext cx="6288588" cy="1889029"/>
+          </a:xfrm>
+          <a:prstGeom prst="straightConnector1">
+            <a:avLst/>
+          </a:prstGeom>
+          <a:ln>
+            <a:tailEnd type="triangle"/>
+          </a:ln>
+        </p:spPr>
+        <p:style>
+          <a:lnRef idx="1">
+            <a:schemeClr val="accent1"/>
+          </a:lnRef>
+          <a:fillRef idx="0">
+            <a:schemeClr val="accent1"/>
+          </a:fillRef>
+          <a:effectRef idx="0">
+            <a:schemeClr val="accent1"/>
+          </a:effectRef>
+          <a:fontRef idx="minor">
+            <a:schemeClr val="tx1"/>
+          </a:fontRef>
+        </p:style>
+      </p:cxnSp>
+      <p:sp>
+        <p:nvSpPr>
+          <p:cNvPr id="35" name="TextBox 34">
+            <a:extLst>
+              <a:ext uri="{FF2B5EF4-FFF2-40B4-BE49-F238E27FC236}">
+                <a16:creationId xmlns:a16="http://schemas.microsoft.com/office/drawing/2014/main" id="{0718C253-7F82-4CD7-B7C7-F4E946CB292D}"/>
+              </a:ext>
+            </a:extLst>
+          </p:cNvPr>
+          <p:cNvSpPr txBox="1"/>
+          <p:nvPr/>
+        </p:nvSpPr>
+        <p:spPr>
+          <a:xfrm rot="18861799">
+            <a:off x="1415366" y="2236588"/>
+            <a:ext cx="974947" cy="246221"/>
+          </a:xfrm>
+          <a:prstGeom prst="rect">
+            <a:avLst/>
+          </a:prstGeom>
+          <a:noFill/>
+        </p:spPr>
+        <p:txBody>
+          <a:bodyPr wrap="none" rtlCol="0">
+            <a:spAutoFit/>
+          </a:bodyPr>
+          <a:lstStyle/>
+          <a:p>
+            <a:r>
+              <a:rPr lang="en-US" sz="1000" dirty="0"/>
+              <a:t>Service metrics</a:t>
+            </a:r>
+            <a:endParaRPr lang="en-GB" sz="1000" dirty="0"/>
+          </a:p>
+        </p:txBody>
+      </p:sp>
+      <p:sp>
+        <p:nvSpPr>
+          <p:cNvPr id="36" name="TextBox 35">
+            <a:extLst>
+              <a:ext uri="{FF2B5EF4-FFF2-40B4-BE49-F238E27FC236}">
+                <a16:creationId xmlns:a16="http://schemas.microsoft.com/office/drawing/2014/main" id="{64F0D5CA-3711-06D8-0092-3230308C4193}"/>
+              </a:ext>
+            </a:extLst>
+          </p:cNvPr>
+          <p:cNvSpPr txBox="1"/>
+          <p:nvPr/>
+        </p:nvSpPr>
+        <p:spPr>
+          <a:xfrm rot="20637809">
+            <a:off x="3531824" y="2065038"/>
+            <a:ext cx="973343" cy="246221"/>
+          </a:xfrm>
+          <a:prstGeom prst="rect">
+            <a:avLst/>
+          </a:prstGeom>
+          <a:noFill/>
+        </p:spPr>
+        <p:txBody>
+          <a:bodyPr wrap="none" rtlCol="0">
+            <a:spAutoFit/>
+          </a:bodyPr>
+          <a:lstStyle/>
+          <a:p>
+            <a:r>
+              <a:rPr lang="en-US" sz="1000" dirty="0"/>
+              <a:t>Processed data</a:t>
+            </a:r>
+            <a:endParaRPr lang="en-GB" sz="1000" dirty="0"/>
+          </a:p>
+        </p:txBody>
+      </p:sp>
+      <p:cxnSp>
+        <p:nvCxnSpPr>
+          <p:cNvPr id="38" name="Connector: Elbow 37">
+            <a:extLst>
+              <a:ext uri="{FF2B5EF4-FFF2-40B4-BE49-F238E27FC236}">
+                <a16:creationId xmlns:a16="http://schemas.microsoft.com/office/drawing/2014/main" id="{3CD8477E-D0B1-6B66-D04B-82A885AB5BD2}"/>
+              </a:ext>
+            </a:extLst>
+          </p:cNvPr>
+          <p:cNvCxnSpPr>
+            <a:cxnSpLocks/>
+            <a:stCxn id="4" idx="0"/>
+            <a:endCxn id="1030" idx="1"/>
+          </p:cNvCxnSpPr>
+          <p:nvPr/>
+        </p:nvCxnSpPr>
+        <p:spPr>
+          <a:xfrm rot="5400000" flipH="1" flipV="1">
+            <a:off x="4446571" y="-105395"/>
+            <a:ext cx="127" cy="6418517"/>
+          </a:xfrm>
+          <a:prstGeom prst="bentConnector2">
+            <a:avLst/>
+          </a:prstGeom>
+          <a:ln>
+            <a:tailEnd type="triangle"/>
+          </a:ln>
+        </p:spPr>
+        <p:style>
+          <a:lnRef idx="1">
+            <a:schemeClr val="accent1"/>
+          </a:lnRef>
+          <a:fillRef idx="0">
+            <a:schemeClr val="accent1"/>
+          </a:fillRef>
+          <a:effectRef idx="0">
+            <a:schemeClr val="accent1"/>
+          </a:effectRef>
+          <a:fontRef idx="minor">
+            <a:schemeClr val="tx1"/>
+          </a:fontRef>
+        </p:style>
+      </p:cxnSp>
+      <p:sp>
+        <p:nvSpPr>
+          <p:cNvPr id="40" name="TextBox 39">
+            <a:extLst>
+              <a:ext uri="{FF2B5EF4-FFF2-40B4-BE49-F238E27FC236}">
+                <a16:creationId xmlns:a16="http://schemas.microsoft.com/office/drawing/2014/main" id="{647C681E-B6ED-C296-4B94-69B26E44DDB7}"/>
+              </a:ext>
+            </a:extLst>
+          </p:cNvPr>
+          <p:cNvSpPr txBox="1"/>
+          <p:nvPr/>
+        </p:nvSpPr>
+        <p:spPr>
+          <a:xfrm>
+            <a:off x="4874176" y="2889885"/>
+            <a:ext cx="949299" cy="246221"/>
+          </a:xfrm>
+          <a:prstGeom prst="rect">
+            <a:avLst/>
+          </a:prstGeom>
+          <a:noFill/>
+        </p:spPr>
+        <p:txBody>
+          <a:bodyPr wrap="none" rtlCol="0">
+            <a:spAutoFit/>
+          </a:bodyPr>
+          <a:lstStyle/>
+          <a:p>
+            <a:r>
+              <a:rPr lang="en-US" sz="1000" dirty="0"/>
+              <a:t>trigger lambda</a:t>
+            </a:r>
+            <a:endParaRPr lang="en-GB" sz="1000" dirty="0"/>
+          </a:p>
+        </p:txBody>
+      </p:sp>
+      <p:cxnSp>
+        <p:nvCxnSpPr>
+          <p:cNvPr id="42" name="Straight Arrow Connector 41">
+            <a:extLst>
+              <a:ext uri="{FF2B5EF4-FFF2-40B4-BE49-F238E27FC236}">
+                <a16:creationId xmlns:a16="http://schemas.microsoft.com/office/drawing/2014/main" id="{E27C220C-B57E-0BA6-E718-1A1BBF0A3EF4}"/>
+              </a:ext>
+            </a:extLst>
+          </p:cNvPr>
+          <p:cNvCxnSpPr>
+            <a:stCxn id="1030" idx="0"/>
+            <a:endCxn id="25" idx="2"/>
+          </p:cNvCxnSpPr>
+          <p:nvPr/>
+        </p:nvCxnSpPr>
+        <p:spPr>
+          <a:xfrm flipV="1">
+            <a:off x="8049699" y="1989813"/>
+            <a:ext cx="0" cy="720180"/>
+          </a:xfrm>
+          <a:prstGeom prst="straightConnector1">
+            <a:avLst/>
+          </a:prstGeom>
+          <a:ln>
+            <a:tailEnd type="triangle"/>
+          </a:ln>
+        </p:spPr>
+        <p:style>
+          <a:lnRef idx="1">
+            <a:schemeClr val="accent1"/>
+          </a:lnRef>
+          <a:fillRef idx="0">
+            <a:schemeClr val="accent1"/>
+          </a:fillRef>
+          <a:effectRef idx="0">
+            <a:schemeClr val="accent1"/>
+          </a:effectRef>
+          <a:fontRef idx="minor">
+            <a:schemeClr val="tx1"/>
+          </a:fontRef>
+        </p:style>
+      </p:cxnSp>
+      <p:sp>
+        <p:nvSpPr>
+          <p:cNvPr id="43" name="TextBox 42">
+            <a:extLst>
+              <a:ext uri="{FF2B5EF4-FFF2-40B4-BE49-F238E27FC236}">
+                <a16:creationId xmlns:a16="http://schemas.microsoft.com/office/drawing/2014/main" id="{DB307399-76E8-8224-CC85-D66F0AF981BA}"/>
+              </a:ext>
+            </a:extLst>
+          </p:cNvPr>
+          <p:cNvSpPr txBox="1"/>
+          <p:nvPr/>
+        </p:nvSpPr>
+        <p:spPr>
+          <a:xfrm>
+            <a:off x="7762569" y="2188148"/>
+            <a:ext cx="638316" cy="246221"/>
+          </a:xfrm>
+          <a:prstGeom prst="rect">
+            <a:avLst/>
+          </a:prstGeom>
+          <a:noFill/>
+        </p:spPr>
+        <p:txBody>
+          <a:bodyPr wrap="none" rtlCol="0">
+            <a:spAutoFit/>
+          </a:bodyPr>
+          <a:lstStyle/>
+          <a:p>
+            <a:r>
+              <a:rPr lang="en-US" sz="1000" dirty="0"/>
+              <a:t>pull data</a:t>
+            </a:r>
+            <a:endParaRPr lang="en-GB" sz="1000" dirty="0"/>
+          </a:p>
+        </p:txBody>
+      </p:sp>
+      <p:cxnSp>
+        <p:nvCxnSpPr>
+          <p:cNvPr id="45" name="Connector: Elbow 44">
+            <a:extLst>
+              <a:ext uri="{FF2B5EF4-FFF2-40B4-BE49-F238E27FC236}">
+                <a16:creationId xmlns:a16="http://schemas.microsoft.com/office/drawing/2014/main" id="{D6ED6E28-010A-AA81-1331-E897DE545351}"/>
+              </a:ext>
+            </a:extLst>
+          </p:cNvPr>
+          <p:cNvCxnSpPr>
+            <a:stCxn id="4" idx="1"/>
+            <a:endCxn id="5" idx="1"/>
+          </p:cNvCxnSpPr>
+          <p:nvPr/>
+        </p:nvCxnSpPr>
+        <p:spPr>
+          <a:xfrm rot="10800000" flipV="1">
+            <a:off x="855676" y="3460458"/>
+            <a:ext cx="12700" cy="1031846"/>
+          </a:xfrm>
+          <a:prstGeom prst="bentConnector3">
+            <a:avLst>
+              <a:gd name="adj1" fmla="val 2460551"/>
+            </a:avLst>
+          </a:prstGeom>
+          <a:ln>
+            <a:tailEnd type="triangle"/>
+          </a:ln>
+        </p:spPr>
+        <p:style>
+          <a:lnRef idx="1">
+            <a:schemeClr val="accent1"/>
+          </a:lnRef>
+          <a:fillRef idx="0">
+            <a:schemeClr val="accent1"/>
+          </a:fillRef>
+          <a:effectRef idx="0">
+            <a:schemeClr val="accent1"/>
+          </a:effectRef>
+          <a:fontRef idx="minor">
+            <a:schemeClr val="tx1"/>
+          </a:fontRef>
+        </p:style>
+      </p:cxnSp>
+      <p:cxnSp>
+        <p:nvCxnSpPr>
+          <p:cNvPr id="47" name="Connector: Elbow 46">
+            <a:extLst>
+              <a:ext uri="{FF2B5EF4-FFF2-40B4-BE49-F238E27FC236}">
+                <a16:creationId xmlns:a16="http://schemas.microsoft.com/office/drawing/2014/main" id="{DC1E2457-9EC7-A0D8-007C-1122CEFF4C62}"/>
+              </a:ext>
+            </a:extLst>
+          </p:cNvPr>
+          <p:cNvCxnSpPr>
+            <a:stCxn id="4" idx="1"/>
+            <a:endCxn id="7" idx="1"/>
+          </p:cNvCxnSpPr>
+          <p:nvPr/>
+        </p:nvCxnSpPr>
+        <p:spPr>
+          <a:xfrm rot="10800000" flipV="1">
+            <a:off x="855676" y="3460457"/>
+            <a:ext cx="12700" cy="1795243"/>
+          </a:xfrm>
+          <a:prstGeom prst="bentConnector3">
+            <a:avLst>
+              <a:gd name="adj1" fmla="val 4111921"/>
+            </a:avLst>
+          </a:prstGeom>
+          <a:ln>
+            <a:tailEnd type="triangle"/>
+          </a:ln>
+        </p:spPr>
+        <p:style>
+          <a:lnRef idx="1">
+            <a:schemeClr val="accent1"/>
+          </a:lnRef>
+          <a:fillRef idx="0">
+            <a:schemeClr val="accent1"/>
+          </a:fillRef>
+          <a:effectRef idx="0">
+            <a:schemeClr val="accent1"/>
+          </a:effectRef>
+          <a:fontRef idx="minor">
+            <a:schemeClr val="tx1"/>
+          </a:fontRef>
+        </p:style>
+      </p:cxnSp>
+      <p:sp>
+        <p:nvSpPr>
+          <p:cNvPr id="51" name="TextBox 50">
+            <a:extLst>
+              <a:ext uri="{FF2B5EF4-FFF2-40B4-BE49-F238E27FC236}">
+                <a16:creationId xmlns:a16="http://schemas.microsoft.com/office/drawing/2014/main" id="{51FD48A6-5A00-C304-3992-C3385999524D}"/>
+              </a:ext>
+            </a:extLst>
+          </p:cNvPr>
+          <p:cNvSpPr txBox="1"/>
+          <p:nvPr/>
+        </p:nvSpPr>
+        <p:spPr>
+          <a:xfrm>
+            <a:off x="314223" y="3259773"/>
+            <a:ext cx="442750" cy="246221"/>
+          </a:xfrm>
+          <a:prstGeom prst="rect">
+            <a:avLst/>
+          </a:prstGeom>
+          <a:noFill/>
+        </p:spPr>
+        <p:txBody>
+          <a:bodyPr wrap="none" rtlCol="0">
+            <a:spAutoFit/>
+          </a:bodyPr>
+          <a:lstStyle/>
+          <a:p>
+            <a:r>
+              <a:rPr lang="en-US" sz="1000" dirty="0"/>
+              <a:t>scale</a:t>
+            </a:r>
+            <a:endParaRPr lang="en-GB" sz="1000" dirty="0"/>
+          </a:p>
+        </p:txBody>
+      </p:sp>
+      <p:cxnSp>
+        <p:nvCxnSpPr>
+          <p:cNvPr id="53" name="Straight Arrow Connector 52">
+            <a:extLst>
+              <a:ext uri="{FF2B5EF4-FFF2-40B4-BE49-F238E27FC236}">
+                <a16:creationId xmlns:a16="http://schemas.microsoft.com/office/drawing/2014/main" id="{A734A4BC-A2E2-9752-9197-A9F5BA5B6321}"/>
+              </a:ext>
+            </a:extLst>
+          </p:cNvPr>
+          <p:cNvCxnSpPr>
+            <a:stCxn id="1030" idx="3"/>
+            <a:endCxn id="1032" idx="1"/>
+          </p:cNvCxnSpPr>
+          <p:nvPr/>
+        </p:nvCxnSpPr>
+        <p:spPr>
+          <a:xfrm>
+            <a:off x="8443505" y="3103799"/>
+            <a:ext cx="1181378" cy="709773"/>
+          </a:xfrm>
+          <a:prstGeom prst="straightConnector1">
+            <a:avLst/>
+          </a:prstGeom>
+          <a:ln>
+            <a:tailEnd type="triangle"/>
+          </a:ln>
+        </p:spPr>
+        <p:style>
+          <a:lnRef idx="1">
+            <a:schemeClr val="accent1"/>
+          </a:lnRef>
+          <a:fillRef idx="0">
+            <a:schemeClr val="accent1"/>
+          </a:fillRef>
+          <a:effectRef idx="0">
+            <a:schemeClr val="accent1"/>
+          </a:effectRef>
+          <a:fontRef idx="minor">
+            <a:schemeClr val="tx1"/>
+          </a:fontRef>
+        </p:style>
+      </p:cxnSp>
+      <p:sp>
+        <p:nvSpPr>
+          <p:cNvPr id="55" name="TextBox 54">
+            <a:extLst>
+              <a:ext uri="{FF2B5EF4-FFF2-40B4-BE49-F238E27FC236}">
+                <a16:creationId xmlns:a16="http://schemas.microsoft.com/office/drawing/2014/main" id="{619A7A04-6585-5987-CA57-08DC73CC3940}"/>
+              </a:ext>
+            </a:extLst>
+          </p:cNvPr>
+          <p:cNvSpPr txBox="1"/>
+          <p:nvPr/>
+        </p:nvSpPr>
+        <p:spPr>
+          <a:xfrm rot="2002342">
+            <a:off x="8643944" y="3271651"/>
+            <a:ext cx="920445" cy="246221"/>
+          </a:xfrm>
+          <a:prstGeom prst="rect">
+            <a:avLst/>
+          </a:prstGeom>
+          <a:noFill/>
+        </p:spPr>
+        <p:txBody>
+          <a:bodyPr wrap="none" rtlCol="0">
+            <a:spAutoFit/>
+          </a:bodyPr>
+          <a:lstStyle/>
+          <a:p>
+            <a:r>
+              <a:rPr lang="en-US" sz="1000" dirty="0"/>
+              <a:t>trained model</a:t>
+            </a:r>
+            <a:endParaRPr lang="en-GB" sz="1000" dirty="0"/>
+          </a:p>
+        </p:txBody>
+      </p:sp>
+      <p:sp>
+        <p:nvSpPr>
+          <p:cNvPr id="56" name="TextBox 55">
+            <a:extLst>
+              <a:ext uri="{FF2B5EF4-FFF2-40B4-BE49-F238E27FC236}">
+                <a16:creationId xmlns:a16="http://schemas.microsoft.com/office/drawing/2014/main" id="{57192531-BC05-6BF0-ED3F-25913AF7D14F}"/>
+              </a:ext>
+            </a:extLst>
+          </p:cNvPr>
+          <p:cNvSpPr txBox="1"/>
+          <p:nvPr/>
+        </p:nvSpPr>
+        <p:spPr>
+          <a:xfrm rot="19647207">
+            <a:off x="8534239" y="4084140"/>
+            <a:ext cx="736099" cy="246221"/>
+          </a:xfrm>
+          <a:prstGeom prst="rect">
+            <a:avLst/>
+          </a:prstGeom>
+          <a:noFill/>
+        </p:spPr>
+        <p:txBody>
+          <a:bodyPr wrap="none" rtlCol="0">
+            <a:spAutoFit/>
+          </a:bodyPr>
+          <a:lstStyle/>
+          <a:p>
+            <a:r>
+              <a:rPr lang="en-US" sz="1000" dirty="0"/>
+              <a:t>pull model</a:t>
+            </a:r>
+            <a:endParaRPr lang="en-GB" sz="1000" dirty="0"/>
+          </a:p>
+        </p:txBody>
+      </p:sp>
+      <p:cxnSp>
+        <p:nvCxnSpPr>
+          <p:cNvPr id="58" name="Straight Arrow Connector 57">
+            <a:extLst>
+              <a:ext uri="{FF2B5EF4-FFF2-40B4-BE49-F238E27FC236}">
+                <a16:creationId xmlns:a16="http://schemas.microsoft.com/office/drawing/2014/main" id="{8EFB4764-D5A2-2B9A-6B8F-87EE86F0F048}"/>
+              </a:ext>
+            </a:extLst>
+          </p:cNvPr>
+          <p:cNvCxnSpPr>
+            <a:stCxn id="18" idx="1"/>
+            <a:endCxn id="4" idx="2"/>
+          </p:cNvCxnSpPr>
+          <p:nvPr/>
+        </p:nvCxnSpPr>
+        <p:spPr>
+          <a:xfrm flipH="1" flipV="1">
+            <a:off x="1237376" y="3816990"/>
+            <a:ext cx="6418517" cy="794601"/>
+          </a:xfrm>
+          <a:prstGeom prst="straightConnector1">
+            <a:avLst/>
+          </a:prstGeom>
+          <a:ln>
+            <a:tailEnd type="triangle"/>
+          </a:ln>
+        </p:spPr>
+        <p:style>
+          <a:lnRef idx="1">
+            <a:schemeClr val="accent1"/>
+          </a:lnRef>
+          <a:fillRef idx="0">
+            <a:schemeClr val="accent1"/>
+          </a:fillRef>
+          <a:effectRef idx="0">
+            <a:schemeClr val="accent1"/>
+          </a:effectRef>
+          <a:fontRef idx="minor">
+            <a:schemeClr val="tx1"/>
+          </a:fontRef>
+        </p:style>
+      </p:cxnSp>
+      <p:sp>
+        <p:nvSpPr>
+          <p:cNvPr id="59" name="TextBox 58">
+            <a:extLst>
+              <a:ext uri="{FF2B5EF4-FFF2-40B4-BE49-F238E27FC236}">
+                <a16:creationId xmlns:a16="http://schemas.microsoft.com/office/drawing/2014/main" id="{B4CE44AA-5CB7-EBAD-3580-68C904F32D92}"/>
+              </a:ext>
+            </a:extLst>
+          </p:cNvPr>
+          <p:cNvSpPr txBox="1"/>
+          <p:nvPr/>
+        </p:nvSpPr>
+        <p:spPr>
+          <a:xfrm rot="421326">
+            <a:off x="4439422" y="4114232"/>
+            <a:ext cx="1981633" cy="246221"/>
+          </a:xfrm>
+          <a:prstGeom prst="rect">
+            <a:avLst/>
+          </a:prstGeom>
+          <a:noFill/>
+        </p:spPr>
+        <p:txBody>
+          <a:bodyPr wrap="none" rtlCol="0">
+            <a:spAutoFit/>
+          </a:bodyPr>
+          <a:lstStyle/>
+          <a:p>
+            <a:r>
+              <a:rPr lang="en-US" sz="1000" dirty="0"/>
+              <a:t>predicted CPU and memory values</a:t>
+            </a:r>
+            <a:endParaRPr lang="en-GB" sz="1000" dirty="0"/>
+          </a:p>
+        </p:txBody>
+      </p:sp>
+      <p:cxnSp>
+        <p:nvCxnSpPr>
+          <p:cNvPr id="63" name="Straight Arrow Connector 62">
+            <a:extLst>
+              <a:ext uri="{FF2B5EF4-FFF2-40B4-BE49-F238E27FC236}">
+                <a16:creationId xmlns:a16="http://schemas.microsoft.com/office/drawing/2014/main" id="{CE06E871-D7BC-A5D5-6570-BFF5A3BC8ACA}"/>
+              </a:ext>
+            </a:extLst>
+          </p:cNvPr>
+          <p:cNvCxnSpPr>
+            <a:stCxn id="18" idx="3"/>
+            <a:endCxn id="1032" idx="1"/>
+          </p:cNvCxnSpPr>
+          <p:nvPr/>
+        </p:nvCxnSpPr>
+        <p:spPr>
+          <a:xfrm flipV="1">
+            <a:off x="8443505" y="3813572"/>
+            <a:ext cx="1181378" cy="798019"/>
+          </a:xfrm>
+          <a:prstGeom prst="straightConnector1">
+            <a:avLst/>
+          </a:prstGeom>
+          <a:ln>
+            <a:tailEnd type="triangle"/>
+          </a:ln>
+        </p:spPr>
+        <p:style>
+          <a:lnRef idx="1">
+            <a:schemeClr val="accent1"/>
+          </a:lnRef>
+          <a:fillRef idx="0">
+            <a:schemeClr val="accent1"/>
+          </a:fillRef>
+          <a:effectRef idx="0">
+            <a:schemeClr val="accent1"/>
+          </a:effectRef>
+          <a:fontRef idx="minor">
+            <a:schemeClr val="tx1"/>
+          </a:fontRef>
+        </p:style>
+      </p:cxnSp>
+    </p:spTree>
+    <p:extLst>
+      <p:ext uri="{BB962C8B-B14F-4D97-AF65-F5344CB8AC3E}">
+        <p14:creationId xmlns:p14="http://schemas.microsoft.com/office/powerpoint/2010/main" val="3926779035"/>
+      </p:ext>
+    </p:extLst>
+  </p:cSld>
+  <p:clrMapOvr>
+    <a:masterClrMapping/>
+  </p:clrMapOvr>
+</p:sld>
+</file>
+
 <file path=ppt/theme/theme1.xml><?xml version="1.0" encoding="utf-8"?>
 <a:theme xmlns:a="http://schemas.openxmlformats.org/drawingml/2006/main" name="Office Theme">
   <a:themeElements>

</xml_diff>